<commit_message>
Added the Firmware to the präsi
</commit_message>
<xml_diff>
--- a/Präsi/Präsentation_10_12_2019.pptx
+++ b/Präsi/Präsentation_10_12_2019.pptx
@@ -5,10 +5,10 @@
     <p:sldMasterId id="2147483648" r:id="rId1"/>
   </p:sldMasterIdLst>
   <p:notesMasterIdLst>
-    <p:notesMasterId r:id="rId11"/>
+    <p:notesMasterId r:id="rId10"/>
   </p:notesMasterIdLst>
   <p:handoutMasterIdLst>
-    <p:handoutMasterId r:id="rId12"/>
+    <p:handoutMasterId r:id="rId11"/>
   </p:handoutMasterIdLst>
   <p:sldIdLst>
     <p:sldId id="342" r:id="rId2"/>
@@ -17,9 +17,8 @@
     <p:sldId id="408" r:id="rId5"/>
     <p:sldId id="412" r:id="rId6"/>
     <p:sldId id="409" r:id="rId7"/>
-    <p:sldId id="411" r:id="rId8"/>
-    <p:sldId id="410" r:id="rId9"/>
-    <p:sldId id="357" r:id="rId10"/>
+    <p:sldId id="410" r:id="rId8"/>
+    <p:sldId id="357" r:id="rId9"/>
   </p:sldIdLst>
   <p:sldSz cx="9144000" cy="6858000" type="screen4x3"/>
   <p:notesSz cx="6858000" cy="9144000"/>
@@ -369,7 +368,7 @@
           <a:p>
             <a:fld id="{C5789427-D9D7-4E3F-AAB0-F134C14E2AB5}" type="slidenum">
               <a:rPr lang="de-DE" smtClean="0"/>
-              <a:t>‹Nr.›</a:t>
+              <a:t>‹#›</a:t>
             </a:fld>
             <a:endParaRPr lang="de-DE"/>
           </a:p>
@@ -626,7 +625,7 @@
           <a:p>
             <a:fld id="{1D215C53-1FA3-4765-8570-BE15BA179994}" type="slidenum">
               <a:rPr lang="de-DE" smtClean="0"/>
-              <a:t>‹Nr.›</a:t>
+              <a:t>‹#›</a:t>
             </a:fld>
             <a:endParaRPr lang="de-DE"/>
           </a:p>
@@ -1257,93 +1256,6 @@
     </p:spTree>
     <p:extLst>
       <p:ext uri="{BB962C8B-B14F-4D97-AF65-F5344CB8AC3E}">
-        <p14:creationId xmlns:p14="http://schemas.microsoft.com/office/powerpoint/2010/main" val="692269855"/>
-      </p:ext>
-    </p:extLst>
-  </p:cSld>
-  <p:clrMapOvr>
-    <a:masterClrMapping/>
-  </p:clrMapOvr>
-</p:notes>
-</file>
-
-<file path=ppt/notesSlides/notesSlide7.xml><?xml version="1.0" encoding="utf-8"?>
-<p:notes xmlns:a="http://schemas.openxmlformats.org/drawingml/2006/main" xmlns:r="http://schemas.openxmlformats.org/officeDocument/2006/relationships" xmlns:p="http://schemas.openxmlformats.org/presentationml/2006/main">
-  <p:cSld>
-    <p:spTree>
-      <p:nvGrpSpPr>
-        <p:cNvPr id="1" name=""/>
-        <p:cNvGrpSpPr/>
-        <p:nvPr/>
-      </p:nvGrpSpPr>
-      <p:grpSpPr>
-        <a:xfrm>
-          <a:off x="0" y="0"/>
-          <a:ext cx="0" cy="0"/>
-          <a:chOff x="0" y="0"/>
-          <a:chExt cx="0" cy="0"/>
-        </a:xfrm>
-      </p:grpSpPr>
-      <p:sp>
-        <p:nvSpPr>
-          <p:cNvPr id="2" name="Folienbildplatzhalter 1"/>
-          <p:cNvSpPr>
-            <a:spLocks noGrp="1" noRot="1" noChangeAspect="1"/>
-          </p:cNvSpPr>
-          <p:nvPr>
-            <p:ph type="sldImg"/>
-          </p:nvPr>
-        </p:nvSpPr>
-        <p:spPr/>
-      </p:sp>
-      <p:sp>
-        <p:nvSpPr>
-          <p:cNvPr id="3" name="Notizenplatzhalter 2"/>
-          <p:cNvSpPr>
-            <a:spLocks noGrp="1"/>
-          </p:cNvSpPr>
-          <p:nvPr>
-            <p:ph type="body" idx="1"/>
-          </p:nvPr>
-        </p:nvSpPr>
-        <p:spPr/>
-        <p:txBody>
-          <a:bodyPr/>
-          <a:lstStyle/>
-          <a:p>
-            <a:pPr marL="0" indent="0">
-              <a:buNone/>
-            </a:pPr>
-            <a:endParaRPr lang="de-DE" dirty="0"/>
-          </a:p>
-        </p:txBody>
-      </p:sp>
-      <p:sp>
-        <p:nvSpPr>
-          <p:cNvPr id="4" name="Foliennummernplatzhalter 3"/>
-          <p:cNvSpPr>
-            <a:spLocks noGrp="1"/>
-          </p:cNvSpPr>
-          <p:nvPr>
-            <p:ph type="sldNum" sz="quarter" idx="5"/>
-          </p:nvPr>
-        </p:nvSpPr>
-        <p:spPr/>
-        <p:txBody>
-          <a:bodyPr/>
-          <a:lstStyle/>
-          <a:p>
-            <a:fld id="{1D215C53-1FA3-4765-8570-BE15BA179994}" type="slidenum">
-              <a:rPr lang="de-DE" smtClean="0"/>
-              <a:t>8</a:t>
-            </a:fld>
-            <a:endParaRPr lang="de-DE"/>
-          </a:p>
-        </p:txBody>
-      </p:sp>
-    </p:spTree>
-    <p:extLst>
-      <p:ext uri="{BB962C8B-B14F-4D97-AF65-F5344CB8AC3E}">
         <p14:creationId xmlns:p14="http://schemas.microsoft.com/office/powerpoint/2010/main" val="365737636"/>
       </p:ext>
     </p:extLst>
@@ -10254,7 +10166,7 @@
             <a:pPr lvl="0"/>
             <a:fld id="{3C264D8F-5AC1-4129-BC87-0A070031A248}" type="slidenum">
               <a:rPr lang="de-DE" smtClean="0"/>
-              <a:t>‹Nr.›</a:t>
+              <a:t>‹#›</a:t>
             </a:fld>
             <a:r>
               <a:rPr lang="de-DE" dirty="0"/>
@@ -10721,40 +10633,39 @@
           <a:lstStyle/>
           <a:p>
             <a:r>
-              <a:rPr lang="de-DE" dirty="0" smtClean="0"/>
+              <a:rPr lang="de-DE" dirty="0"/>
               <a:t>Thorben Kompalla</a:t>
             </a:r>
           </a:p>
           <a:p>
             <a:r>
-              <a:rPr lang="de-DE" dirty="0" smtClean="0"/>
+              <a:rPr lang="de-DE" dirty="0"/>
               <a:t>Andres Gallego</a:t>
             </a:r>
           </a:p>
           <a:p>
             <a:r>
-              <a:rPr lang="de-DE" dirty="0" smtClean="0"/>
+              <a:rPr lang="de-DE" dirty="0"/>
               <a:t>Nils Hamsen</a:t>
             </a:r>
           </a:p>
           <a:p>
             <a:r>
-              <a:rPr lang="de-DE" dirty="0" smtClean="0"/>
+              <a:rPr lang="de-DE" dirty="0"/>
               <a:t>Andres Vega</a:t>
             </a:r>
           </a:p>
           <a:p>
             <a:r>
-              <a:rPr lang="de-DE" dirty="0" smtClean="0"/>
+              <a:rPr lang="de-DE" dirty="0"/>
               <a:t>Philipp Wolters</a:t>
             </a:r>
           </a:p>
           <a:p>
             <a:r>
-              <a:rPr lang="de-DE" dirty="0" smtClean="0"/>
+              <a:rPr lang="de-DE" dirty="0"/>
               <a:t>Roman Lütkenhaus</a:t>
             </a:r>
-            <a:endParaRPr lang="de-DE" dirty="0"/>
           </a:p>
         </p:txBody>
       </p:sp>
@@ -10822,13 +10733,6 @@
   <p:clrMapOvr>
     <a:masterClrMapping/>
   </p:clrMapOvr>
-  <p:timing>
-    <p:tnLst>
-      <p:par>
-        <p:cTn id="1" dur="indefinite" restart="never" nodeType="tmRoot"/>
-      </p:par>
-    </p:tnLst>
-  </p:timing>
 </p:sld>
 </file>
 
@@ -10934,7 +10838,7 @@
           <p:cNvPr id="6" name="Textplatzhalter 5">
             <a:extLst>
               <a:ext uri="{FF2B5EF4-FFF2-40B4-BE49-F238E27FC236}">
-                <a16:creationId xmlns="" xmlns:a16="http://schemas.microsoft.com/office/drawing/2014/main" id="{F6D2B8BA-0165-4A91-960E-9C3608EDE5CB}"/>
+                <a16:creationId xmlns:a16="http://schemas.microsoft.com/office/drawing/2014/main" id="{F6D2B8BA-0165-4A91-960E-9C3608EDE5CB}"/>
               </a:ext>
             </a:extLst>
           </p:cNvPr>
@@ -10962,7 +10866,7 @@
           <p:cNvPr id="7" name="Textfeld 6">
             <a:extLst>
               <a:ext uri="{FF2B5EF4-FFF2-40B4-BE49-F238E27FC236}">
-                <a16:creationId xmlns="" xmlns:a16="http://schemas.microsoft.com/office/drawing/2014/main" id="{6CC2C0E2-EB87-4DA8-BACA-91F08EBF1797}"/>
+                <a16:creationId xmlns:a16="http://schemas.microsoft.com/office/drawing/2014/main" id="{6CC2C0E2-EB87-4DA8-BACA-91F08EBF1797}"/>
               </a:ext>
             </a:extLst>
           </p:cNvPr>
@@ -11044,7 +10948,7 @@
               <a:buChar char="-"/>
             </a:pPr>
             <a:r>
-              <a:rPr lang="de-DE" sz="1900" dirty="0" smtClean="0">
+              <a:rPr lang="de-DE" sz="1900" dirty="0">
                 <a:sym typeface="Wingdings" panose="05000000000000000000" pitchFamily="2" charset="2"/>
               </a:rPr>
               <a:t>Hardwarekonzept</a:t>
@@ -11071,14 +10975,11 @@
               <a:buChar char="-"/>
             </a:pPr>
             <a:r>
-              <a:rPr lang="de-DE" sz="1900" dirty="0" smtClean="0">
+              <a:rPr lang="de-DE" sz="1900" dirty="0">
                 <a:sym typeface="Wingdings" panose="05000000000000000000" pitchFamily="2" charset="2"/>
               </a:rPr>
               <a:t>Platinenlayout</a:t>
             </a:r>
-            <a:endParaRPr lang="de-DE" sz="1900" dirty="0">
-              <a:sym typeface="Wingdings" panose="05000000000000000000" pitchFamily="2" charset="2"/>
-            </a:endParaRPr>
           </a:p>
           <a:p>
             <a:pPr marL="342900" indent="-342900">
@@ -11104,7 +11005,7 @@
               <a:rPr lang="de-DE" sz="1900" dirty="0">
                 <a:sym typeface="Wingdings" panose="05000000000000000000" pitchFamily="2" charset="2"/>
               </a:rPr>
-              <a:t>Softwarearchitektur auf dem Mikrocontroller</a:t>
+              <a:t>Firmware auf dem Mikrocontroller</a:t>
             </a:r>
           </a:p>
           <a:p>
@@ -11158,13 +11059,6 @@
   <p:clrMapOvr>
     <a:masterClrMapping/>
   </p:clrMapOvr>
-  <p:timing>
-    <p:tnLst>
-      <p:par>
-        <p:cTn id="1" dur="indefinite" restart="never" nodeType="tmRoot"/>
-      </p:par>
-    </p:tnLst>
-  </p:timing>
 </p:sld>
 </file>
 
@@ -11299,7 +11193,7 @@
           <p:cNvPr id="6" name="Textplatzhalter 5">
             <a:extLst>
               <a:ext uri="{FF2B5EF4-FFF2-40B4-BE49-F238E27FC236}">
-                <a16:creationId xmlns="" xmlns:a16="http://schemas.microsoft.com/office/drawing/2014/main" id="{F6D2B8BA-0165-4A91-960E-9C3608EDE5CB}"/>
+                <a16:creationId xmlns:a16="http://schemas.microsoft.com/office/drawing/2014/main" id="{F6D2B8BA-0165-4A91-960E-9C3608EDE5CB}"/>
               </a:ext>
             </a:extLst>
           </p:cNvPr>
@@ -11327,7 +11221,7 @@
           <p:cNvPr id="7" name="Textfeld 6">
             <a:extLst>
               <a:ext uri="{FF2B5EF4-FFF2-40B4-BE49-F238E27FC236}">
-                <a16:creationId xmlns="" xmlns:a16="http://schemas.microsoft.com/office/drawing/2014/main" id="{6CC2C0E2-EB87-4DA8-BACA-91F08EBF1797}"/>
+                <a16:creationId xmlns:a16="http://schemas.microsoft.com/office/drawing/2014/main" id="{6CC2C0E2-EB87-4DA8-BACA-91F08EBF1797}"/>
               </a:ext>
             </a:extLst>
           </p:cNvPr>
@@ -11442,13 +11336,6 @@
   <p:clrMapOvr>
     <a:masterClrMapping/>
   </p:clrMapOvr>
-  <p:timing>
-    <p:tnLst>
-      <p:par>
-        <p:cTn id="1" dur="indefinite" restart="never" nodeType="tmRoot"/>
-      </p:par>
-    </p:tnLst>
-  </p:timing>
 </p:sld>
 </file>
 
@@ -11554,7 +11441,7 @@
           <p:cNvPr id="6" name="Textplatzhalter 5">
             <a:extLst>
               <a:ext uri="{FF2B5EF4-FFF2-40B4-BE49-F238E27FC236}">
-                <a16:creationId xmlns="" xmlns:a16="http://schemas.microsoft.com/office/drawing/2014/main" id="{F6D2B8BA-0165-4A91-960E-9C3608EDE5CB}"/>
+                <a16:creationId xmlns:a16="http://schemas.microsoft.com/office/drawing/2014/main" id="{F6D2B8BA-0165-4A91-960E-9C3608EDE5CB}"/>
               </a:ext>
             </a:extLst>
           </p:cNvPr>
@@ -11582,7 +11469,7 @@
           <p:cNvPr id="7" name="Textfeld 6">
             <a:extLst>
               <a:ext uri="{FF2B5EF4-FFF2-40B4-BE49-F238E27FC236}">
-                <a16:creationId xmlns="" xmlns:a16="http://schemas.microsoft.com/office/drawing/2014/main" id="{6CC2C0E2-EB87-4DA8-BACA-91F08EBF1797}"/>
+                <a16:creationId xmlns:a16="http://schemas.microsoft.com/office/drawing/2014/main" id="{6CC2C0E2-EB87-4DA8-BACA-91F08EBF1797}"/>
               </a:ext>
             </a:extLst>
           </p:cNvPr>
@@ -11727,13 +11614,6 @@
   <p:clrMapOvr>
     <a:masterClrMapping/>
   </p:clrMapOvr>
-  <p:timing>
-    <p:tnLst>
-      <p:par>
-        <p:cTn id="1" dur="indefinite" restart="never" nodeType="tmRoot"/>
-      </p:par>
-    </p:tnLst>
-  </p:timing>
 </p:sld>
 </file>
 
@@ -11839,7 +11719,7 @@
           <p:cNvPr id="6" name="Textplatzhalter 5">
             <a:extLst>
               <a:ext uri="{FF2B5EF4-FFF2-40B4-BE49-F238E27FC236}">
-                <a16:creationId xmlns="" xmlns:a16="http://schemas.microsoft.com/office/drawing/2014/main" id="{F6D2B8BA-0165-4A91-960E-9C3608EDE5CB}"/>
+                <a16:creationId xmlns:a16="http://schemas.microsoft.com/office/drawing/2014/main" id="{F6D2B8BA-0165-4A91-960E-9C3608EDE5CB}"/>
               </a:ext>
             </a:extLst>
           </p:cNvPr>
@@ -11856,10 +11736,9 @@
           <a:lstStyle/>
           <a:p>
             <a:r>
-              <a:rPr lang="de-DE" dirty="0" smtClean="0"/>
+              <a:rPr lang="de-DE" dirty="0"/>
               <a:t>Platinenlayout</a:t>
             </a:r>
-            <a:endParaRPr lang="de-DE" dirty="0"/>
           </a:p>
         </p:txBody>
       </p:sp>
@@ -11873,13 +11752,6 @@
   <p:clrMapOvr>
     <a:masterClrMapping/>
   </p:clrMapOvr>
-  <p:timing>
-    <p:tnLst>
-      <p:par>
-        <p:cTn id="1" dur="indefinite" restart="never" nodeType="tmRoot"/>
-      </p:par>
-    </p:tnLst>
-  </p:timing>
 </p:sld>
 </file>
 
@@ -11955,7 +11827,7 @@
           <p:cNvPr id="6" name="Textplatzhalter 5">
             <a:extLst>
               <a:ext uri="{FF2B5EF4-FFF2-40B4-BE49-F238E27FC236}">
-                <a16:creationId xmlns="" xmlns:a16="http://schemas.microsoft.com/office/drawing/2014/main" id="{F6D2B8BA-0165-4A91-960E-9C3608EDE5CB}"/>
+                <a16:creationId xmlns:a16="http://schemas.microsoft.com/office/drawing/2014/main" id="{F6D2B8BA-0165-4A91-960E-9C3608EDE5CB}"/>
               </a:ext>
             </a:extLst>
           </p:cNvPr>
@@ -11973,7 +11845,7 @@
           <a:p>
             <a:r>
               <a:rPr lang="de-DE" dirty="0"/>
-              <a:t>Softwarearchitektur</a:t>
+              <a:t>Firmware</a:t>
             </a:r>
           </a:p>
         </p:txBody>
@@ -11983,7 +11855,7 @@
           <p:cNvPr id="7" name="Textfeld 6">
             <a:extLst>
               <a:ext uri="{FF2B5EF4-FFF2-40B4-BE49-F238E27FC236}">
-                <a16:creationId xmlns="" xmlns:a16="http://schemas.microsoft.com/office/drawing/2014/main" id="{6CC2C0E2-EB87-4DA8-BACA-91F08EBF1797}"/>
+                <a16:creationId xmlns:a16="http://schemas.microsoft.com/office/drawing/2014/main" id="{6CC2C0E2-EB87-4DA8-BACA-91F08EBF1797}"/>
               </a:ext>
             </a:extLst>
           </p:cNvPr>
@@ -11992,8 +11864,8 @@
         </p:nvSpPr>
         <p:spPr>
           <a:xfrm>
-            <a:off x="611560" y="1826079"/>
-            <a:ext cx="8208912" cy="3605282"/>
+            <a:off x="107504" y="1688949"/>
+            <a:ext cx="6120680" cy="4248535"/>
           </a:xfrm>
           <a:prstGeom prst="rect">
             <a:avLst/>
@@ -12010,8 +11882,8 @@
               <a:lnSpc>
                 <a:spcPct val="110000"/>
               </a:lnSpc>
-              <a:buFont typeface="Symbol" panose="05050102010706020507" pitchFamily="18" charset="2"/>
-              <a:buChar char="-"/>
+              <a:buFont typeface="Wingdings" panose="05000000000000000000" pitchFamily="2" charset="2"/>
+              <a:buChar char="ü"/>
             </a:pPr>
             <a:r>
               <a:rPr lang="de-DE" sz="1900" dirty="0">
@@ -12067,8 +11939,8 @@
               <a:lnSpc>
                 <a:spcPct val="110000"/>
               </a:lnSpc>
-              <a:buFont typeface="Symbol" panose="05050102010706020507" pitchFamily="18" charset="2"/>
-              <a:buChar char="-"/>
+              <a:buFont typeface="Wingdings" panose="05000000000000000000" pitchFamily="2" charset="2"/>
+              <a:buChar char="ü"/>
             </a:pPr>
             <a:r>
               <a:rPr lang="de-DE" sz="1900" dirty="0">
@@ -12152,6 +12024,42 @@
           </a:p>
         </p:txBody>
       </p:sp>
+      <p:pic>
+        <p:nvPicPr>
+          <p:cNvPr id="8" name="Picture 7" descr="A close up of a logo&#10;&#10;Description automatically generated">
+            <a:extLst>
+              <a:ext uri="{FF2B5EF4-FFF2-40B4-BE49-F238E27FC236}">
+                <a16:creationId xmlns:a16="http://schemas.microsoft.com/office/drawing/2014/main" id="{AEEA005E-BD39-4C8E-9FF4-D90A06AFD7EF}"/>
+              </a:ext>
+            </a:extLst>
+          </p:cNvPr>
+          <p:cNvPicPr>
+            <a:picLocks noChangeAspect="1"/>
+          </p:cNvPicPr>
+          <p:nvPr/>
+        </p:nvPicPr>
+        <p:blipFill>
+          <a:blip r:embed="rId3">
+            <a:extLst>
+              <a:ext uri="{28A0092B-C50C-407E-A947-70E740481C1C}">
+                <a14:useLocalDpi xmlns:a14="http://schemas.microsoft.com/office/drawing/2010/main" val="0"/>
+              </a:ext>
+            </a:extLst>
+          </a:blip>
+          <a:stretch>
+            <a:fillRect/>
+          </a:stretch>
+        </p:blipFill>
+        <p:spPr>
+          <a:xfrm>
+            <a:off x="6012160" y="980728"/>
+            <a:ext cx="2321049" cy="5051695"/>
+          </a:xfrm>
+          <a:prstGeom prst="rect">
+            <a:avLst/>
+          </a:prstGeom>
+        </p:spPr>
+      </p:pic>
     </p:spTree>
     <p:extLst>
       <p:ext uri="{BB962C8B-B14F-4D97-AF65-F5344CB8AC3E}">
@@ -12162,13 +12070,6 @@
   <p:clrMapOvr>
     <a:masterClrMapping/>
   </p:clrMapOvr>
-  <p:timing>
-    <p:tnLst>
-      <p:par>
-        <p:cTn id="1" dur="indefinite" restart="never" nodeType="tmRoot"/>
-      </p:par>
-    </p:tnLst>
-  </p:timing>
 </p:sld>
 </file>
 
@@ -12244,7 +12145,7 @@
           <p:cNvPr id="6" name="Textplatzhalter 5">
             <a:extLst>
               <a:ext uri="{FF2B5EF4-FFF2-40B4-BE49-F238E27FC236}">
-                <a16:creationId xmlns="" xmlns:a16="http://schemas.microsoft.com/office/drawing/2014/main" id="{F6D2B8BA-0165-4A91-960E-9C3608EDE5CB}"/>
+                <a16:creationId xmlns:a16="http://schemas.microsoft.com/office/drawing/2014/main" id="{F6D2B8BA-0165-4A91-960E-9C3608EDE5CB}"/>
               </a:ext>
             </a:extLst>
           </p:cNvPr>
@@ -12255,97 +12156,38 @@
             <p:ph type="body" sz="quarter" idx="13"/>
           </p:nvPr>
         </p:nvSpPr>
-        <p:spPr/>
+        <p:spPr>
+          <a:xfrm>
+            <a:off x="358775" y="872231"/>
+            <a:ext cx="6877521" cy="953847"/>
+          </a:xfrm>
+        </p:spPr>
         <p:txBody>
           <a:bodyPr/>
           <a:lstStyle/>
           <a:p>
             <a:r>
-              <a:rPr lang="de-DE" dirty="0"/>
-              <a:t>Softwarearchitektur</a:t>
-            </a:r>
-          </a:p>
-        </p:txBody>
-      </p:sp>
-      <p:sp>
-        <p:nvSpPr>
-          <p:cNvPr id="2" name="Rechteck 1">
-            <a:extLst>
-              <a:ext uri="{FF2B5EF4-FFF2-40B4-BE49-F238E27FC236}">
-                <a16:creationId xmlns="" xmlns:a16="http://schemas.microsoft.com/office/drawing/2014/main" id="{2EE8C140-89EE-4AC9-AC28-93F94669923C}"/>
-              </a:ext>
-            </a:extLst>
-          </p:cNvPr>
-          <p:cNvSpPr/>
-          <p:nvPr/>
-        </p:nvSpPr>
-        <p:spPr>
-          <a:xfrm>
-            <a:off x="1557197" y="2188558"/>
-            <a:ext cx="2041984" cy="1656184"/>
-          </a:xfrm>
-          <a:prstGeom prst="rect">
-            <a:avLst/>
-          </a:prstGeom>
-          <a:solidFill>
-            <a:schemeClr val="bg1"/>
-          </a:solidFill>
-          <a:ln>
-            <a:solidFill>
-              <a:schemeClr val="tx1"/>
-            </a:solidFill>
-          </a:ln>
-        </p:spPr>
-        <p:style>
-          <a:lnRef idx="2">
-            <a:schemeClr val="accent1">
-              <a:shade val="50000"/>
-            </a:schemeClr>
-          </a:lnRef>
-          <a:fillRef idx="1">
-            <a:schemeClr val="accent1"/>
-          </a:fillRef>
-          <a:effectRef idx="0">
-            <a:schemeClr val="accent1"/>
-          </a:effectRef>
-          <a:fontRef idx="minor">
-            <a:schemeClr val="lt1"/>
-          </a:fontRef>
-        </p:style>
-        <p:txBody>
-          <a:bodyPr rtlCol="0" anchor="ctr"/>
-          <a:lstStyle/>
-          <a:p>
-            <a:pPr algn="ctr">
-              <a:lnSpc>
-                <a:spcPct val="110000"/>
-              </a:lnSpc>
-            </a:pPr>
-            <a:endParaRPr lang="de-DE" sz="1900">
-              <a:solidFill>
-                <a:schemeClr val="tx1"/>
-              </a:solidFill>
-            </a:endParaRPr>
+              <a:rPr lang="de-DE" sz="2400" dirty="0">
+                <a:sym typeface="Wingdings" panose="05000000000000000000" pitchFamily="2" charset="2"/>
+              </a:rPr>
+              <a:t>TTN – Anbindung und Darstellung der Daten</a:t>
+            </a:r>
+          </a:p>
+          <a:p>
+            <a:endParaRPr lang="de-DE" sz="2400" dirty="0"/>
           </a:p>
         </p:txBody>
       </p:sp>
     </p:spTree>
     <p:extLst>
       <p:ext uri="{BB962C8B-B14F-4D97-AF65-F5344CB8AC3E}">
-        <p14:creationId xmlns:p14="http://schemas.microsoft.com/office/powerpoint/2010/main" val="2405470028"/>
+        <p14:creationId xmlns:p14="http://schemas.microsoft.com/office/powerpoint/2010/main" val="3233527318"/>
       </p:ext>
     </p:extLst>
   </p:cSld>
   <p:clrMapOvr>
     <a:masterClrMapping/>
   </p:clrMapOvr>
-  <p:timing>
-    <p:tnLst>
-      <p:par>
-        <p:cTn id="1" dur="indefinite" restart="never" nodeType="tmRoot"/>
-      </p:par>
-    </p:tnLst>
-  </p:timing>
 </p:sld>
 </file>
 
@@ -12381,241 +12223,6 @@
           <a:bodyPr/>
           <a:lstStyle/>
           <a:p>
-            <a:endParaRPr lang="de-DE" dirty="0"/>
-          </a:p>
-        </p:txBody>
-      </p:sp>
-      <p:sp>
-        <p:nvSpPr>
-          <p:cNvPr id="9" name="Titel 1"/>
-          <p:cNvSpPr>
-            <a:spLocks noGrp="1"/>
-          </p:cNvSpPr>
-          <p:nvPr>
-            <p:ph type="title"/>
-          </p:nvPr>
-        </p:nvSpPr>
-        <p:spPr>
-          <a:xfrm>
-            <a:off x="358775" y="374650"/>
-            <a:ext cx="6733505" cy="1002121"/>
-          </a:xfrm>
-        </p:spPr>
-        <p:txBody>
-          <a:bodyPr/>
-          <a:lstStyle/>
-          <a:p>
-            <a:r>
-              <a:rPr lang="de-DE" sz="2800" dirty="0"/>
-              <a:t>Energieautarke Feinstaubmessung</a:t>
-            </a:r>
-            <a:br>
-              <a:rPr lang="de-DE" sz="2800" dirty="0"/>
-            </a:br>
-            <a:endParaRPr lang="de-DE" sz="2800" dirty="0"/>
-          </a:p>
-        </p:txBody>
-      </p:sp>
-      <p:sp>
-        <p:nvSpPr>
-          <p:cNvPr id="6" name="Textplatzhalter 5">
-            <a:extLst>
-              <a:ext uri="{FF2B5EF4-FFF2-40B4-BE49-F238E27FC236}">
-                <a16:creationId xmlns="" xmlns:a16="http://schemas.microsoft.com/office/drawing/2014/main" id="{F6D2B8BA-0165-4A91-960E-9C3608EDE5CB}"/>
-              </a:ext>
-            </a:extLst>
-          </p:cNvPr>
-          <p:cNvSpPr>
-            <a:spLocks noGrp="1"/>
-          </p:cNvSpPr>
-          <p:nvPr>
-            <p:ph type="body" sz="quarter" idx="13"/>
-          </p:nvPr>
-        </p:nvSpPr>
-        <p:spPr>
-          <a:xfrm>
-            <a:off x="358775" y="872231"/>
-            <a:ext cx="6877521" cy="953847"/>
-          </a:xfrm>
-        </p:spPr>
-        <p:txBody>
-          <a:bodyPr/>
-          <a:lstStyle/>
-          <a:p>
-            <a:r>
-              <a:rPr lang="de-DE" sz="2400" dirty="0">
-                <a:sym typeface="Wingdings" panose="05000000000000000000" pitchFamily="2" charset="2"/>
-              </a:rPr>
-              <a:t>TTN – Anbindung und Darstellung der Daten</a:t>
-            </a:r>
-          </a:p>
-          <a:p>
-            <a:endParaRPr lang="de-DE" sz="2400" dirty="0"/>
-          </a:p>
-        </p:txBody>
-      </p:sp>
-      <p:sp>
-        <p:nvSpPr>
-          <p:cNvPr id="7" name="Textfeld 6">
-            <a:extLst>
-              <a:ext uri="{FF2B5EF4-FFF2-40B4-BE49-F238E27FC236}">
-                <a16:creationId xmlns="" xmlns:a16="http://schemas.microsoft.com/office/drawing/2014/main" id="{6CC2C0E2-EB87-4DA8-BACA-91F08EBF1797}"/>
-              </a:ext>
-            </a:extLst>
-          </p:cNvPr>
-          <p:cNvSpPr txBox="1"/>
-          <p:nvPr/>
-        </p:nvSpPr>
-        <p:spPr>
-          <a:xfrm>
-            <a:off x="611560" y="1826079"/>
-            <a:ext cx="8208912" cy="1997150"/>
-          </a:xfrm>
-          <a:prstGeom prst="rect">
-            <a:avLst/>
-          </a:prstGeom>
-          <a:noFill/>
-        </p:spPr>
-        <p:txBody>
-          <a:bodyPr wrap="square" rtlCol="0">
-            <a:spAutoFit/>
-          </a:bodyPr>
-          <a:lstStyle/>
-          <a:p>
-            <a:pPr marL="342900" indent="-342900">
-              <a:lnSpc>
-                <a:spcPct val="110000"/>
-              </a:lnSpc>
-              <a:buFontTx/>
-              <a:buChar char="-"/>
-            </a:pPr>
-            <a:r>
-              <a:rPr lang="de-DE" sz="1900" dirty="0">
-                <a:sym typeface="Wingdings" panose="05000000000000000000" pitchFamily="2" charset="2"/>
-              </a:rPr>
-              <a:t>Aufbau der Hardware</a:t>
-            </a:r>
-          </a:p>
-          <a:p>
-            <a:pPr marL="342900" indent="-342900">
-              <a:lnSpc>
-                <a:spcPct val="110000"/>
-              </a:lnSpc>
-              <a:buFontTx/>
-              <a:buChar char="-"/>
-            </a:pPr>
-            <a:endParaRPr lang="de-DE" sz="1900" dirty="0">
-              <a:sym typeface="Wingdings" panose="05000000000000000000" pitchFamily="2" charset="2"/>
-            </a:endParaRPr>
-          </a:p>
-          <a:p>
-            <a:pPr marL="342900" indent="-342900">
-              <a:lnSpc>
-                <a:spcPct val="110000"/>
-              </a:lnSpc>
-              <a:buFontTx/>
-              <a:buChar char="-"/>
-            </a:pPr>
-            <a:r>
-              <a:rPr lang="de-DE" sz="1900" dirty="0">
-                <a:sym typeface="Wingdings" panose="05000000000000000000" pitchFamily="2" charset="2"/>
-              </a:rPr>
-              <a:t>Softwarearchitektur auf dem Mikrocontroller</a:t>
-            </a:r>
-          </a:p>
-          <a:p>
-            <a:pPr marL="342900" indent="-342900">
-              <a:lnSpc>
-                <a:spcPct val="110000"/>
-              </a:lnSpc>
-              <a:buFontTx/>
-              <a:buChar char="-"/>
-            </a:pPr>
-            <a:endParaRPr lang="de-DE" sz="1900" dirty="0">
-              <a:sym typeface="Wingdings" panose="05000000000000000000" pitchFamily="2" charset="2"/>
-            </a:endParaRPr>
-          </a:p>
-          <a:p>
-            <a:pPr marL="342900" indent="-342900">
-              <a:lnSpc>
-                <a:spcPct val="110000"/>
-              </a:lnSpc>
-              <a:buFontTx/>
-              <a:buChar char="-"/>
-            </a:pPr>
-            <a:r>
-              <a:rPr lang="de-DE" sz="1900" dirty="0">
-                <a:sym typeface="Wingdings" panose="05000000000000000000" pitchFamily="2" charset="2"/>
-              </a:rPr>
-              <a:t>TTN – Anbindung und Darstellung der Daten</a:t>
-            </a:r>
-          </a:p>
-          <a:p>
-            <a:pPr marL="800100" lvl="1" indent="-342900">
-              <a:lnSpc>
-                <a:spcPct val="110000"/>
-              </a:lnSpc>
-              <a:buFontTx/>
-              <a:buChar char="-"/>
-            </a:pPr>
-            <a:endParaRPr lang="de-DE" sz="1900" dirty="0">
-              <a:sym typeface="Wingdings" panose="05000000000000000000" pitchFamily="2" charset="2"/>
-            </a:endParaRPr>
-          </a:p>
-        </p:txBody>
-      </p:sp>
-    </p:spTree>
-    <p:extLst>
-      <p:ext uri="{BB962C8B-B14F-4D97-AF65-F5344CB8AC3E}">
-        <p14:creationId xmlns:p14="http://schemas.microsoft.com/office/powerpoint/2010/main" val="3233527318"/>
-      </p:ext>
-    </p:extLst>
-  </p:cSld>
-  <p:clrMapOvr>
-    <a:masterClrMapping/>
-  </p:clrMapOvr>
-  <p:timing>
-    <p:tnLst>
-      <p:par>
-        <p:cTn id="1" dur="indefinite" restart="never" nodeType="tmRoot"/>
-      </p:par>
-    </p:tnLst>
-  </p:timing>
-</p:sld>
-</file>
-
-<file path=ppt/slides/slide9.xml><?xml version="1.0" encoding="utf-8"?>
-<p:sld xmlns:a="http://schemas.openxmlformats.org/drawingml/2006/main" xmlns:r="http://schemas.openxmlformats.org/officeDocument/2006/relationships" xmlns:p="http://schemas.openxmlformats.org/presentationml/2006/main">
-  <p:cSld>
-    <p:spTree>
-      <p:nvGrpSpPr>
-        <p:cNvPr id="1" name=""/>
-        <p:cNvGrpSpPr/>
-        <p:nvPr/>
-      </p:nvGrpSpPr>
-      <p:grpSpPr>
-        <a:xfrm>
-          <a:off x="0" y="0"/>
-          <a:ext cx="0" cy="0"/>
-          <a:chOff x="0" y="0"/>
-          <a:chExt cx="0" cy="0"/>
-        </a:xfrm>
-      </p:grpSpPr>
-      <p:sp>
-        <p:nvSpPr>
-          <p:cNvPr id="3" name="Fußzeilenplatzhalter 2"/>
-          <p:cNvSpPr>
-            <a:spLocks noGrp="1"/>
-          </p:cNvSpPr>
-          <p:nvPr>
-            <p:ph type="ftr" sz="quarter" idx="11"/>
-          </p:nvPr>
-        </p:nvSpPr>
-        <p:spPr/>
-        <p:txBody>
-          <a:bodyPr/>
-          <a:lstStyle/>
-          <a:p>
             <a:r>
               <a:rPr lang="de-DE" dirty="0"/>
               <a:t>Thorben Kompalla</a:t>
@@ -12680,13 +12287,6 @@
   <p:clrMapOvr>
     <a:masterClrMapping/>
   </p:clrMapOvr>
-  <p:timing>
-    <p:tnLst>
-      <p:par>
-        <p:cTn id="1" dur="indefinite" restart="never" nodeType="tmRoot"/>
-      </p:par>
-    </p:tnLst>
-  </p:timing>
 </p:sld>
 </file>
 

</xml_diff>

<commit_message>
add images to ppt
</commit_message>
<xml_diff>
--- a/Präsi/Präsentation_10_12_2019.pptx
+++ b/Präsi/Präsentation_10_12_2019.pptx
@@ -302,7 +302,7 @@
           <a:p>
             <a:fld id="{62B40CA4-95C5-4BFB-A997-E4C6DCAE2984}" type="datetimeFigureOut">
               <a:rPr lang="de-DE" smtClean="0"/>
-              <a:t>10.12.2019</a:t>
+              <a:t>10.12.19</a:t>
             </a:fld>
             <a:endParaRPr lang="de-DE"/>
           </a:p>
@@ -368,7 +368,7 @@
           <a:p>
             <a:fld id="{C5789427-D9D7-4E3F-AAB0-F134C14E2AB5}" type="slidenum">
               <a:rPr lang="de-DE" smtClean="0"/>
-              <a:t>‹#›</a:t>
+              <a:t>‹Nr.›</a:t>
             </a:fld>
             <a:endParaRPr lang="de-DE"/>
           </a:p>
@@ -467,7 +467,7 @@
           <a:p>
             <a:fld id="{7AF25995-C0F1-4DBA-A518-A2E36E1024A3}" type="datetimeFigureOut">
               <a:rPr lang="de-DE" smtClean="0"/>
-              <a:t>10.12.2019</a:t>
+              <a:t>10.12.19</a:t>
             </a:fld>
             <a:endParaRPr lang="de-DE"/>
           </a:p>
@@ -625,7 +625,7 @@
           <a:p>
             <a:fld id="{1D215C53-1FA3-4765-8570-BE15BA179994}" type="slidenum">
               <a:rPr lang="de-DE" smtClean="0"/>
-              <a:t>‹#›</a:t>
+              <a:t>‹Nr.›</a:t>
             </a:fld>
             <a:endParaRPr lang="de-DE"/>
           </a:p>
@@ -10166,7 +10166,7 @@
             <a:pPr lvl="0"/>
             <a:fld id="{3C264D8F-5AC1-4129-BC87-0A070031A248}" type="slidenum">
               <a:rPr lang="de-DE" smtClean="0"/>
-              <a:t>‹#›</a:t>
+              <a:t>‹Nr.›</a:t>
             </a:fld>
             <a:r>
               <a:rPr lang="de-DE" dirty="0"/>
@@ -12174,7 +12174,160 @@
             </a:r>
           </a:p>
           <a:p>
+            <a:r>
+              <a:rPr lang="de-DE" sz="2400" dirty="0">
+                <a:sym typeface="Wingdings" panose="05000000000000000000" pitchFamily="2" charset="2"/>
+              </a:rPr>
+              <a:t>DEMO</a:t>
+            </a:r>
+          </a:p>
+          <a:p>
             <a:endParaRPr lang="de-DE" sz="2400" dirty="0"/>
+          </a:p>
+        </p:txBody>
+      </p:sp>
+      <p:pic>
+        <p:nvPicPr>
+          <p:cNvPr id="4" name="Grafik 3">
+            <a:extLst>
+              <a:ext uri="{FF2B5EF4-FFF2-40B4-BE49-F238E27FC236}">
+                <a16:creationId xmlns:a16="http://schemas.microsoft.com/office/drawing/2014/main" id="{6B91CFB7-E30A-4845-8B20-DC4679DA5086}"/>
+              </a:ext>
+            </a:extLst>
+          </p:cNvPr>
+          <p:cNvPicPr>
+            <a:picLocks noChangeAspect="1"/>
+          </p:cNvPicPr>
+          <p:nvPr/>
+        </p:nvPicPr>
+        <p:blipFill>
+          <a:blip r:embed="rId3">
+            <a:extLst>
+              <a:ext uri="{28A0092B-C50C-407E-A947-70E740481C1C}">
+                <a14:useLocalDpi xmlns:a14="http://schemas.microsoft.com/office/drawing/2010/main" val="0"/>
+              </a:ext>
+            </a:extLst>
+          </a:blip>
+          <a:stretch>
+            <a:fillRect/>
+          </a:stretch>
+        </p:blipFill>
+        <p:spPr>
+          <a:xfrm>
+            <a:off x="6300192" y="2532520"/>
+            <a:ext cx="1376771" cy="1376771"/>
+          </a:xfrm>
+          <a:prstGeom prst="rect">
+            <a:avLst/>
+          </a:prstGeom>
+        </p:spPr>
+      </p:pic>
+      <p:pic>
+        <p:nvPicPr>
+          <p:cNvPr id="7" name="Grafik 6">
+            <a:extLst>
+              <a:ext uri="{FF2B5EF4-FFF2-40B4-BE49-F238E27FC236}">
+                <a16:creationId xmlns:a16="http://schemas.microsoft.com/office/drawing/2014/main" id="{571D7425-0B97-6142-A892-2C1CC8BFC127}"/>
+              </a:ext>
+            </a:extLst>
+          </p:cNvPr>
+          <p:cNvPicPr>
+            <a:picLocks noChangeAspect="1"/>
+          </p:cNvPicPr>
+          <p:nvPr/>
+        </p:nvPicPr>
+        <p:blipFill>
+          <a:blip r:embed="rId4">
+            <a:extLst>
+              <a:ext uri="{28A0092B-C50C-407E-A947-70E740481C1C}">
+                <a14:useLocalDpi xmlns:a14="http://schemas.microsoft.com/office/drawing/2010/main" val="0"/>
+              </a:ext>
+            </a:extLst>
+          </a:blip>
+          <a:stretch>
+            <a:fillRect/>
+          </a:stretch>
+        </p:blipFill>
+        <p:spPr>
+          <a:xfrm>
+            <a:off x="3025891" y="4342234"/>
+            <a:ext cx="3092217" cy="1643535"/>
+          </a:xfrm>
+          <a:prstGeom prst="rect">
+            <a:avLst/>
+          </a:prstGeom>
+        </p:spPr>
+      </p:pic>
+      <p:pic>
+        <p:nvPicPr>
+          <p:cNvPr id="10" name="Grafik 9">
+            <a:extLst>
+              <a:ext uri="{FF2B5EF4-FFF2-40B4-BE49-F238E27FC236}">
+                <a16:creationId xmlns:a16="http://schemas.microsoft.com/office/drawing/2014/main" id="{E7B556CF-3C91-3E4B-9502-F084B7A3B2DB}"/>
+              </a:ext>
+            </a:extLst>
+          </p:cNvPr>
+          <p:cNvPicPr>
+            <a:picLocks noChangeAspect="1"/>
+          </p:cNvPicPr>
+          <p:nvPr/>
+        </p:nvPicPr>
+        <p:blipFill>
+          <a:blip r:embed="rId5">
+            <a:extLst>
+              <a:ext uri="{28A0092B-C50C-407E-A947-70E740481C1C}">
+                <a14:useLocalDpi xmlns:a14="http://schemas.microsoft.com/office/drawing/2010/main" val="0"/>
+              </a:ext>
+            </a:extLst>
+          </a:blip>
+          <a:stretch>
+            <a:fillRect/>
+          </a:stretch>
+        </p:blipFill>
+        <p:spPr>
+          <a:xfrm>
+            <a:off x="876535" y="2743200"/>
+            <a:ext cx="2921000" cy="685800"/>
+          </a:xfrm>
+          <a:prstGeom prst="rect">
+            <a:avLst/>
+          </a:prstGeom>
+        </p:spPr>
+      </p:pic>
+      <p:sp>
+        <p:nvSpPr>
+          <p:cNvPr id="13" name="Textfeld 12">
+            <a:extLst>
+              <a:ext uri="{FF2B5EF4-FFF2-40B4-BE49-F238E27FC236}">
+                <a16:creationId xmlns:a16="http://schemas.microsoft.com/office/drawing/2014/main" id="{C5A75743-BDE4-5C45-BA2E-B49749515132}"/>
+              </a:ext>
+            </a:extLst>
+          </p:cNvPr>
+          <p:cNvSpPr txBox="1"/>
+          <p:nvPr/>
+        </p:nvSpPr>
+        <p:spPr>
+          <a:xfrm>
+            <a:off x="7888224" y="4986528"/>
+            <a:ext cx="184731" cy="389017"/>
+          </a:xfrm>
+          <a:prstGeom prst="rect">
+            <a:avLst/>
+          </a:prstGeom>
+          <a:noFill/>
+        </p:spPr>
+        <p:txBody>
+          <a:bodyPr wrap="none" rtlCol="0">
+            <a:spAutoFit/>
+          </a:bodyPr>
+          <a:lstStyle/>
+          <a:p>
+            <a:pPr>
+              <a:lnSpc>
+                <a:spcPct val="110000"/>
+              </a:lnSpc>
+            </a:pPr>
+            <a:endParaRPr lang="de-DE" sz="1900" dirty="0" err="1"/>
           </a:p>
         </p:txBody>
       </p:sp>

</xml_diff>